<commit_message>
new file:   Mentor Diary.docx
</commit_message>
<xml_diff>
--- a/Project Presentation Template.pptx
+++ b/Project Presentation Template.pptx
@@ -1490,7 +1490,7 @@
           <a:p>
             <a:pPr algn="ctr"/>
             <a:r>
-              <a:rPr lang="en-IN" sz="3200" b="1" dirty="0" err="1"/>
+              <a:rPr lang="en-IN" sz="3200" b="1" dirty="0"/>
               <a:t>AdaptiPlan</a:t>
             </a:r>
             <a:r>
@@ -1502,7 +1502,7 @@
             <a:pPr algn="ctr"/>
             <a:r>
               <a:rPr lang="en-IN" sz="3200" dirty="0"/>
-              <a:t>                    Climate Change Mitigation</a:t>
+              <a:t>          Climate Change Mitigation</a:t>
             </a:r>
           </a:p>
         </p:txBody>
@@ -4592,7 +4592,7 @@
         </p:nvSpPr>
         <p:spPr>
           <a:xfrm>
-            <a:off x="878541" y="895357"/>
+            <a:off x="878541" y="833401"/>
             <a:ext cx="10434918" cy="5816977"/>
           </a:xfrm>
           <a:prstGeom prst="rect">
@@ -4694,7 +4694,7 @@
               <a:tabLst/>
               <a:defRPr/>
             </a:pPr>
-            <a:endParaRPr kumimoji="0" lang="en-US" sz="2800" b="0" i="0" u="none" strike="noStrike" kern="1200" cap="none" spc="0" normalizeH="0" baseline="0" noProof="0" dirty="0">
+            <a:endParaRPr kumimoji="0" lang="en-US" sz="2000" b="0" i="0" u="none" strike="noStrike" kern="1200" cap="none" spc="0" normalizeH="0" baseline="0" noProof="0" dirty="0">
               <a:ln>
                 <a:noFill/>
               </a:ln>
@@ -4907,7 +4907,7 @@
         </p:nvSpPr>
         <p:spPr>
           <a:xfrm>
-            <a:off x="842682" y="833401"/>
+            <a:off x="842682" y="833084"/>
             <a:ext cx="10506636" cy="4832092"/>
           </a:xfrm>
           <a:prstGeom prst="rect">

</xml_diff>